<commit_message>
Adiciona exemplo de sistema de Support Center para atendimento online de clientes de uma empresa. O sistema é apenas um exemplo implementado utilizando o protocolo XMPP.
</commit_message>
<xml_diff>
--- a/projects/06-xmpp-chat-client/xmpp.pptx
+++ b/projects/06-xmpp-chat-client/xmpp.pptx
@@ -213,7 +213,7 @@
           <a:p>
             <a:fld id="{7497B6E1-7C5B-524D-B5EB-5E6695205380}" type="datetimeFigureOut">
               <a:rPr lang="pt-BR" smtClean="0"/>
-              <a:t>18/11/2018</a:t>
+              <a:t>19/11/2018</a:t>
             </a:fld>
             <a:endParaRPr lang="pt-BR"/>
           </a:p>
@@ -651,7 +651,7 @@
           <a:p>
             <a:fld id="{19E7D63B-43B5-8A4C-BD12-76889BE136BD}" type="datetime1">
               <a:rPr lang="en-US" smtClean="0"/>
-              <a:t>11/18/18</a:t>
+              <a:t>11/19/18</a:t>
             </a:fld>
             <a:endParaRPr lang="en-US" dirty="0"/>
           </a:p>
@@ -918,7 +918,7 @@
           <a:p>
             <a:fld id="{124E9894-F119-A64C-B7CB-D7CE860A73BE}" type="datetime1">
               <a:rPr lang="en-US" smtClean="0"/>
-              <a:t>11/18/18</a:t>
+              <a:t>11/19/18</a:t>
             </a:fld>
             <a:endParaRPr lang="en-US" dirty="0"/>
           </a:p>
@@ -1150,7 +1150,7 @@
           <a:p>
             <a:fld id="{124E9894-F119-A64C-B7CB-D7CE860A73BE}" type="datetime1">
               <a:rPr lang="en-US" smtClean="0"/>
-              <a:t>11/18/18</a:t>
+              <a:t>11/19/18</a:t>
             </a:fld>
             <a:endParaRPr lang="en-US" dirty="0"/>
           </a:p>
@@ -1461,7 +1461,7 @@
           <a:p>
             <a:fld id="{124E9894-F119-A64C-B7CB-D7CE860A73BE}" type="datetime1">
               <a:rPr lang="en-US" smtClean="0"/>
-              <a:t>11/18/18</a:t>
+              <a:t>11/19/18</a:t>
             </a:fld>
             <a:endParaRPr lang="en-US" dirty="0"/>
           </a:p>
@@ -1935,7 +1935,7 @@
           <a:p>
             <a:fld id="{B4BBB50B-BAA3-9748-978F-08A7877AB7D9}" type="datetime1">
               <a:rPr lang="en-US" smtClean="0"/>
-              <a:t>11/18/18</a:t>
+              <a:t>11/19/18</a:t>
             </a:fld>
             <a:endParaRPr lang="en-US" dirty="0"/>
           </a:p>
@@ -2482,7 +2482,7 @@
           <a:p>
             <a:fld id="{124E9894-F119-A64C-B7CB-D7CE860A73BE}" type="datetime1">
               <a:rPr lang="en-US" smtClean="0"/>
-              <a:t>11/18/18</a:t>
+              <a:t>11/19/18</a:t>
             </a:fld>
             <a:endParaRPr lang="en-US" dirty="0"/>
           </a:p>
@@ -3257,7 +3257,7 @@
           <a:p>
             <a:fld id="{124E9894-F119-A64C-B7CB-D7CE860A73BE}" type="datetime1">
               <a:rPr lang="en-US" smtClean="0"/>
-              <a:t>11/18/18</a:t>
+              <a:t>11/19/18</a:t>
             </a:fld>
             <a:endParaRPr lang="en-US" dirty="0"/>
           </a:p>
@@ -3433,7 +3433,7 @@
           <a:p>
             <a:fld id="{45040DEA-CE02-EF42-8F10-34F709D8505D}" type="datetime1">
               <a:rPr lang="en-US" smtClean="0"/>
-              <a:t>11/18/18</a:t>
+              <a:t>11/19/18</a:t>
             </a:fld>
             <a:endParaRPr lang="en-US" dirty="0"/>
           </a:p>
@@ -3656,7 +3656,7 @@
           <a:p>
             <a:fld id="{A0C1C801-5706-434E-AB65-DDFBCF1F55D2}" type="datetime1">
               <a:rPr lang="en-US" smtClean="0"/>
-              <a:t>11/18/18</a:t>
+              <a:t>11/19/18</a:t>
             </a:fld>
             <a:endParaRPr lang="en-US" dirty="0"/>
           </a:p>
@@ -3836,7 +3836,7 @@
           <a:p>
             <a:fld id="{39AE0FD8-7D7B-EA4F-8AF8-8B97820A0C5D}" type="datetime1">
               <a:rPr lang="en-US" smtClean="0"/>
-              <a:t>11/18/18</a:t>
+              <a:t>11/19/18</a:t>
             </a:fld>
             <a:endParaRPr lang="en-US" dirty="0"/>
           </a:p>
@@ -4125,7 +4125,7 @@
           <a:p>
             <a:fld id="{7FC94D43-3F68-DC43-8EF0-95FB3D51CCCF}" type="datetime1">
               <a:rPr lang="en-US" smtClean="0"/>
-              <a:t>11/18/18</a:t>
+              <a:t>11/19/18</a:t>
             </a:fld>
             <a:endParaRPr lang="en-US" dirty="0"/>
           </a:p>
@@ -4367,7 +4367,7 @@
           <a:p>
             <a:fld id="{BD42CFC2-1CE8-9045-8C9C-0F183F0FB455}" type="datetime1">
               <a:rPr lang="en-US" smtClean="0"/>
-              <a:t>11/18/18</a:t>
+              <a:t>11/19/18</a:t>
             </a:fld>
             <a:endParaRPr lang="en-US" dirty="0"/>
           </a:p>
@@ -4746,7 +4746,7 @@
           <a:p>
             <a:fld id="{F1B5C6E2-D044-C748-9C41-86C9B2F84EB9}" type="datetime1">
               <a:rPr lang="en-US" smtClean="0"/>
-              <a:t>11/18/18</a:t>
+              <a:t>11/19/18</a:t>
             </a:fld>
             <a:endParaRPr lang="en-US" dirty="0"/>
           </a:p>
@@ -4864,7 +4864,7 @@
           <a:p>
             <a:fld id="{359C32BA-C166-AC45-9FCD-8BF0F43629D9}" type="datetime1">
               <a:rPr lang="en-US" smtClean="0"/>
-              <a:t>11/18/18</a:t>
+              <a:t>11/19/18</a:t>
             </a:fld>
             <a:endParaRPr lang="en-US" dirty="0"/>
           </a:p>
@@ -4959,7 +4959,7 @@
           <a:p>
             <a:fld id="{E5D0D591-4B92-A44B-A0EA-798E76AD0368}" type="datetime1">
               <a:rPr lang="en-US" smtClean="0"/>
-              <a:t>11/18/18</a:t>
+              <a:t>11/19/18</a:t>
             </a:fld>
             <a:endParaRPr lang="en-US" dirty="0"/>
           </a:p>
@@ -5208,7 +5208,7 @@
           <a:p>
             <a:fld id="{8201F472-E17F-4B47-A44B-A2249FA27ED2}" type="datetime1">
               <a:rPr lang="en-US" smtClean="0"/>
-              <a:t>11/18/18</a:t>
+              <a:t>11/19/18</a:t>
             </a:fld>
             <a:endParaRPr lang="en-US" dirty="0"/>
           </a:p>
@@ -5465,7 +5465,7 @@
           <a:p>
             <a:fld id="{8BEFB9EE-CDF2-6F49-80F4-278D1604F10C}" type="datetime1">
               <a:rPr lang="en-US" smtClean="0"/>
-              <a:t>11/18/18</a:t>
+              <a:t>11/19/18</a:t>
             </a:fld>
             <a:endParaRPr lang="en-US" dirty="0"/>
           </a:p>
@@ -5708,7 +5708,7 @@
           <a:p>
             <a:fld id="{124E9894-F119-A64C-B7CB-D7CE860A73BE}" type="datetime1">
               <a:rPr lang="en-US" smtClean="0"/>
-              <a:t>11/18/18</a:t>
+              <a:t>11/19/18</a:t>
             </a:fld>
             <a:endParaRPr lang="en-US" dirty="0"/>
           </a:p>

</xml_diff>

<commit_message>
Atualiza apresentação XMPP, incluindo detalhes de chamadas P2P de voz e vídeo
</commit_message>
<xml_diff>
--- a/projects/06-xmpp-chat-client/xmpp.pptx
+++ b/projects/06-xmpp-chat-client/xmpp.pptx
@@ -5,7 +5,7 @@
     <p:sldMasterId id="2147484007" r:id="rId1"/>
   </p:sldMasterIdLst>
   <p:notesMasterIdLst>
-    <p:notesMasterId r:id="rId19"/>
+    <p:notesMasterId r:id="rId20"/>
   </p:notesMasterIdLst>
   <p:sldIdLst>
     <p:sldId id="266" r:id="rId2"/>
@@ -24,7 +24,8 @@
     <p:sldId id="293" r:id="rId15"/>
     <p:sldId id="294" r:id="rId16"/>
     <p:sldId id="295" r:id="rId17"/>
-    <p:sldId id="281" r:id="rId18"/>
+    <p:sldId id="296" r:id="rId18"/>
+    <p:sldId id="281" r:id="rId19"/>
   </p:sldIdLst>
   <p:sldSz cx="12192000" cy="6858000"/>
   <p:notesSz cx="6858000" cy="9144000"/>
@@ -180,7 +181,7 @@
             </a:lvl1pPr>
           </a:lstStyle>
           <a:p>
-            <a:endParaRPr lang="pt-BR"/>
+            <a:endParaRPr lang="pt-BR" dirty="0"/>
           </a:p>
         </p:txBody>
       </p:sp>
@@ -213,9 +214,9 @@
           <a:p>
             <a:fld id="{7497B6E1-7C5B-524D-B5EB-5E6695205380}" type="datetimeFigureOut">
               <a:rPr lang="pt-BR" smtClean="0"/>
-              <a:t>19/11/2018</a:t>
+              <a:t>22/11/2018</a:t>
             </a:fld>
-            <a:endParaRPr lang="pt-BR"/>
+            <a:endParaRPr lang="pt-BR" dirty="0"/>
           </a:p>
         </p:txBody>
       </p:sp>
@@ -248,7 +249,7 @@
           <a:bodyPr vert="horz" lIns="91440" tIns="45720" rIns="91440" bIns="45720" rtlCol="0" anchor="ctr"/>
           <a:lstStyle/>
           <a:p>
-            <a:endParaRPr lang="pt-BR"/>
+            <a:endParaRPr lang="pt-BR" dirty="0"/>
           </a:p>
         </p:txBody>
       </p:sp>
@@ -339,7 +340,7 @@
             </a:lvl1pPr>
           </a:lstStyle>
           <a:p>
-            <a:endParaRPr lang="pt-BR"/>
+            <a:endParaRPr lang="pt-BR" dirty="0"/>
           </a:p>
         </p:txBody>
       </p:sp>
@@ -374,7 +375,7 @@
               <a:rPr lang="pt-BR" smtClean="0"/>
               <a:t>‹#›</a:t>
             </a:fld>
-            <a:endParaRPr lang="pt-BR"/>
+            <a:endParaRPr lang="pt-BR" dirty="0"/>
           </a:p>
         </p:txBody>
       </p:sp>
@@ -651,7 +652,7 @@
           <a:p>
             <a:fld id="{19E7D63B-43B5-8A4C-BD12-76889BE136BD}" type="datetime1">
               <a:rPr lang="en-US" smtClean="0"/>
-              <a:t>11/19/18</a:t>
+              <a:t>11/22/18</a:t>
             </a:fld>
             <a:endParaRPr lang="en-US" dirty="0"/>
           </a:p>
@@ -829,10 +830,9 @@
           </a:lstStyle>
           <a:p>
             <a:r>
-              <a:rPr lang="en-US"/>
+              <a:rPr lang="en-US" dirty="0"/>
               <a:t>Click icon to add picture</a:t>
             </a:r>
-            <a:endParaRPr lang="en-US" dirty="0"/>
           </a:p>
         </p:txBody>
       </p:sp>
@@ -918,7 +918,7 @@
           <a:p>
             <a:fld id="{124E9894-F119-A64C-B7CB-D7CE860A73BE}" type="datetime1">
               <a:rPr lang="en-US" smtClean="0"/>
-              <a:t>11/19/18</a:t>
+              <a:t>11/22/18</a:t>
             </a:fld>
             <a:endParaRPr lang="en-US" dirty="0"/>
           </a:p>
@@ -1150,7 +1150,7 @@
           <a:p>
             <a:fld id="{124E9894-F119-A64C-B7CB-D7CE860A73BE}" type="datetime1">
               <a:rPr lang="en-US" smtClean="0"/>
-              <a:t>11/19/18</a:t>
+              <a:t>11/22/18</a:t>
             </a:fld>
             <a:endParaRPr lang="en-US" dirty="0"/>
           </a:p>
@@ -1461,7 +1461,7 @@
           <a:p>
             <a:fld id="{124E9894-F119-A64C-B7CB-D7CE860A73BE}" type="datetime1">
               <a:rPr lang="en-US" smtClean="0"/>
-              <a:t>11/19/18</a:t>
+              <a:t>11/22/18</a:t>
             </a:fld>
             <a:endParaRPr lang="en-US" dirty="0"/>
           </a:p>
@@ -1935,7 +1935,7 @@
           <a:p>
             <a:fld id="{B4BBB50B-BAA3-9748-978F-08A7877AB7D9}" type="datetime1">
               <a:rPr lang="en-US" smtClean="0"/>
-              <a:t>11/19/18</a:t>
+              <a:t>11/22/18</a:t>
             </a:fld>
             <a:endParaRPr lang="en-US" dirty="0"/>
           </a:p>
@@ -2482,7 +2482,7 @@
           <a:p>
             <a:fld id="{124E9894-F119-A64C-B7CB-D7CE860A73BE}" type="datetime1">
               <a:rPr lang="en-US" smtClean="0"/>
-              <a:t>11/19/18</a:t>
+              <a:t>11/22/18</a:t>
             </a:fld>
             <a:endParaRPr lang="en-US" dirty="0"/>
           </a:p>
@@ -2732,10 +2732,9 @@
           </a:lstStyle>
           <a:p>
             <a:r>
-              <a:rPr lang="en-US"/>
+              <a:rPr lang="en-US" dirty="0"/>
               <a:t>Click icon to add picture</a:t>
             </a:r>
-            <a:endParaRPr lang="en-US" dirty="0"/>
           </a:p>
         </p:txBody>
       </p:sp>
@@ -2949,10 +2948,9 @@
           </a:lstStyle>
           <a:p>
             <a:r>
-              <a:rPr lang="en-US"/>
+              <a:rPr lang="en-US" dirty="0"/>
               <a:t>Click icon to add picture</a:t>
             </a:r>
-            <a:endParaRPr lang="en-US" dirty="0"/>
           </a:p>
         </p:txBody>
       </p:sp>
@@ -3166,10 +3164,9 @@
           </a:lstStyle>
           <a:p>
             <a:r>
-              <a:rPr lang="en-US"/>
+              <a:rPr lang="en-US" dirty="0"/>
               <a:t>Click icon to add picture</a:t>
             </a:r>
-            <a:endParaRPr lang="en-US" dirty="0"/>
           </a:p>
         </p:txBody>
       </p:sp>
@@ -3257,7 +3254,7 @@
           <a:p>
             <a:fld id="{124E9894-F119-A64C-B7CB-D7CE860A73BE}" type="datetime1">
               <a:rPr lang="en-US" smtClean="0"/>
-              <a:t>11/19/18</a:t>
+              <a:t>11/22/18</a:t>
             </a:fld>
             <a:endParaRPr lang="en-US" dirty="0"/>
           </a:p>
@@ -3433,7 +3430,7 @@
           <a:p>
             <a:fld id="{45040DEA-CE02-EF42-8F10-34F709D8505D}" type="datetime1">
               <a:rPr lang="en-US" smtClean="0"/>
-              <a:t>11/19/18</a:t>
+              <a:t>11/22/18</a:t>
             </a:fld>
             <a:endParaRPr lang="en-US" dirty="0"/>
           </a:p>
@@ -3656,7 +3653,7 @@
           <a:p>
             <a:fld id="{A0C1C801-5706-434E-AB65-DDFBCF1F55D2}" type="datetime1">
               <a:rPr lang="en-US" smtClean="0"/>
-              <a:t>11/19/18</a:t>
+              <a:t>11/22/18</a:t>
             </a:fld>
             <a:endParaRPr lang="en-US" dirty="0"/>
           </a:p>
@@ -3836,7 +3833,7 @@
           <a:p>
             <a:fld id="{39AE0FD8-7D7B-EA4F-8AF8-8B97820A0C5D}" type="datetime1">
               <a:rPr lang="en-US" smtClean="0"/>
-              <a:t>11/19/18</a:t>
+              <a:t>11/22/18</a:t>
             </a:fld>
             <a:endParaRPr lang="en-US" dirty="0"/>
           </a:p>
@@ -4125,7 +4122,7 @@
           <a:p>
             <a:fld id="{7FC94D43-3F68-DC43-8EF0-95FB3D51CCCF}" type="datetime1">
               <a:rPr lang="en-US" smtClean="0"/>
-              <a:t>11/19/18</a:t>
+              <a:t>11/22/18</a:t>
             </a:fld>
             <a:endParaRPr lang="en-US" dirty="0"/>
           </a:p>
@@ -4367,7 +4364,7 @@
           <a:p>
             <a:fld id="{BD42CFC2-1CE8-9045-8C9C-0F183F0FB455}" type="datetime1">
               <a:rPr lang="en-US" smtClean="0"/>
-              <a:t>11/19/18</a:t>
+              <a:t>11/22/18</a:t>
             </a:fld>
             <a:endParaRPr lang="en-US" dirty="0"/>
           </a:p>
@@ -4746,7 +4743,7 @@
           <a:p>
             <a:fld id="{F1B5C6E2-D044-C748-9C41-86C9B2F84EB9}" type="datetime1">
               <a:rPr lang="en-US" smtClean="0"/>
-              <a:t>11/19/18</a:t>
+              <a:t>11/22/18</a:t>
             </a:fld>
             <a:endParaRPr lang="en-US" dirty="0"/>
           </a:p>
@@ -4864,7 +4861,7 @@
           <a:p>
             <a:fld id="{359C32BA-C166-AC45-9FCD-8BF0F43629D9}" type="datetime1">
               <a:rPr lang="en-US" smtClean="0"/>
-              <a:t>11/19/18</a:t>
+              <a:t>11/22/18</a:t>
             </a:fld>
             <a:endParaRPr lang="en-US" dirty="0"/>
           </a:p>
@@ -4959,7 +4956,7 @@
           <a:p>
             <a:fld id="{E5D0D591-4B92-A44B-A0EA-798E76AD0368}" type="datetime1">
               <a:rPr lang="en-US" smtClean="0"/>
-              <a:t>11/19/18</a:t>
+              <a:t>11/22/18</a:t>
             </a:fld>
             <a:endParaRPr lang="en-US" dirty="0"/>
           </a:p>
@@ -5208,7 +5205,7 @@
           <a:p>
             <a:fld id="{8201F472-E17F-4B47-A44B-A2249FA27ED2}" type="datetime1">
               <a:rPr lang="en-US" smtClean="0"/>
-              <a:t>11/19/18</a:t>
+              <a:t>11/22/18</a:t>
             </a:fld>
             <a:endParaRPr lang="en-US" dirty="0"/>
           </a:p>
@@ -5376,10 +5373,9 @@
           </a:lstStyle>
           <a:p>
             <a:r>
-              <a:rPr lang="en-US"/>
+              <a:rPr lang="en-US" dirty="0"/>
               <a:t>Click icon to add picture</a:t>
             </a:r>
-            <a:endParaRPr lang="en-US" dirty="0"/>
           </a:p>
         </p:txBody>
       </p:sp>
@@ -5465,7 +5461,7 @@
           <a:p>
             <a:fld id="{8BEFB9EE-CDF2-6F49-80F4-278D1604F10C}" type="datetime1">
               <a:rPr lang="en-US" smtClean="0"/>
-              <a:t>11/19/18</a:t>
+              <a:t>11/22/18</a:t>
             </a:fld>
             <a:endParaRPr lang="en-US" dirty="0"/>
           </a:p>
@@ -5708,7 +5704,7 @@
           <a:p>
             <a:fld id="{124E9894-F119-A64C-B7CB-D7CE860A73BE}" type="datetime1">
               <a:rPr lang="en-US" smtClean="0"/>
-              <a:t>11/19/18</a:t>
+              <a:t>11/22/18</a:t>
             </a:fld>
             <a:endParaRPr lang="en-US" dirty="0"/>
           </a:p>
@@ -6155,43 +6151,7 @@
             </a:r>
             <a:r>
               <a:rPr lang="pt-BR" sz="4400" b="1" i="1" dirty="0"/>
-              <a:t>XMPP: </a:t>
-            </a:r>
-            <a:r>
-              <a:rPr lang="pt-BR" sz="4400" b="1" i="1" dirty="0" err="1"/>
-              <a:t>eXtensible</a:t>
-            </a:r>
-            <a:r>
-              <a:rPr lang="pt-BR" sz="4400" b="1" i="1" dirty="0"/>
-              <a:t> </a:t>
-            </a:r>
-            <a:r>
-              <a:rPr lang="pt-BR" sz="4400" b="1" i="1" dirty="0" err="1"/>
-              <a:t>Messaging</a:t>
-            </a:r>
-            <a:r>
-              <a:rPr lang="pt-BR" sz="4400" b="1" i="1" dirty="0"/>
-              <a:t> </a:t>
-            </a:r>
-            <a:r>
-              <a:rPr lang="pt-BR" sz="4400" b="1" i="1" dirty="0" err="1"/>
-              <a:t>and</a:t>
-            </a:r>
-            <a:r>
-              <a:rPr lang="pt-BR" sz="4400" b="1" i="1" dirty="0"/>
-              <a:t> </a:t>
-            </a:r>
-            <a:r>
-              <a:rPr lang="pt-BR" sz="4400" b="1" i="1" dirty="0" err="1"/>
-              <a:t>Presense</a:t>
-            </a:r>
-            <a:r>
-              <a:rPr lang="pt-BR" sz="4400" b="1" i="1" dirty="0"/>
-              <a:t> </a:t>
-            </a:r>
-            <a:r>
-              <a:rPr lang="pt-BR" sz="4400" b="1" i="1" dirty="0" err="1"/>
-              <a:t>Protocol</a:t>
+              <a:t>XMPP: eXtensible Messaging and Presense Protocol</a:t>
             </a:r>
             <a:br>
               <a:rPr lang="pt-BR" sz="4400" b="1" i="1" dirty="0"/>
@@ -8303,15 +8263,7 @@
           <a:p>
             <a:r>
               <a:rPr lang="pt-BR" sz="2400" dirty="0"/>
-              <a:t>Como o XMPP é um protocolo aberto e </a:t>
-            </a:r>
-            <a:r>
-              <a:rPr lang="pt-BR" sz="2400" dirty="0" err="1"/>
-              <a:t>interoperável</a:t>
-            </a:r>
-            <a:r>
-              <a:rPr lang="pt-BR" sz="2400" dirty="0"/>
-              <a:t>, clientes de um domínio podem enviar mensagens para clientes de outro domínio</a:t>
+              <a:t>Como o XMPP é um protocolo aberto e interoperável, clientes de um domínio podem enviar mensagens para clientes de outro domínio</a:t>
             </a:r>
           </a:p>
           <a:p>
@@ -9064,23 +9016,7 @@
           <a:p>
             <a:r>
               <a:rPr lang="pt-BR" sz="2400" dirty="0"/>
-              <a:t>O cliente comumente apenas acessa recursos em diferentes serviços (como páginas adicionais, arquivos </a:t>
-            </a:r>
-            <a:r>
-              <a:rPr lang="pt-BR" sz="2400" dirty="0" err="1"/>
-              <a:t>js</a:t>
-            </a:r>
-            <a:r>
-              <a:rPr lang="pt-BR" sz="2400" dirty="0"/>
-              <a:t> e </a:t>
-            </a:r>
-            <a:r>
-              <a:rPr lang="pt-BR" sz="2400" dirty="0" err="1"/>
-              <a:t>css</a:t>
-            </a:r>
-            <a:r>
-              <a:rPr lang="pt-BR" sz="2400" dirty="0"/>
-              <a:t>, etc.)</a:t>
+              <a:t>O cliente comumente apenas acessa recursos em diferentes serviços (como páginas adicionais, arquivos js e css, etc.)</a:t>
             </a:r>
           </a:p>
           <a:p>
@@ -11503,6 +11439,871 @@
       </p:grpSpPr>
       <p:sp>
         <p:nvSpPr>
+          <p:cNvPr id="2" name="Title 1">
+            <a:extLst>
+              <a:ext uri="{FF2B5EF4-FFF2-40B4-BE49-F238E27FC236}">
+                <a16:creationId xmlns:a16="http://schemas.microsoft.com/office/drawing/2014/main" id="{58204B45-BA2F-544A-ADBD-2B584480C63E}"/>
+              </a:ext>
+            </a:extLst>
+          </p:cNvPr>
+          <p:cNvSpPr>
+            <a:spLocks noGrp="1"/>
+          </p:cNvSpPr>
+          <p:nvPr>
+            <p:ph type="title"/>
+          </p:nvPr>
+        </p:nvSpPr>
+        <p:spPr>
+          <a:xfrm>
+            <a:off x="3635679" y="365037"/>
+            <a:ext cx="8589364" cy="1005811"/>
+          </a:xfrm>
+        </p:spPr>
+        <p:txBody>
+          <a:bodyPr>
+            <a:normAutofit fontScale="90000"/>
+          </a:bodyPr>
+          <a:lstStyle/>
+          <a:p>
+            <a:pPr algn="ctr"/>
+            <a:r>
+              <a:rPr lang="pt-BR" b="1" dirty="0">
+                <a:solidFill>
+                  <a:schemeClr val="bg1"/>
+                </a:solidFill>
+                <a:effectLst>
+                  <a:outerShdw blurRad="228600" dist="50800" dir="5400000" algn="ctr" rotWithShape="0">
+                    <a:schemeClr val="tx1"/>
+                  </a:outerShdw>
+                </a:effectLst>
+              </a:rPr>
+              <a:t>Arquitetura </a:t>
+            </a:r>
+            <a:r>
+              <a:rPr lang="pt-BR" b="1" dirty="0" err="1">
+                <a:solidFill>
+                  <a:schemeClr val="bg1"/>
+                </a:solidFill>
+                <a:effectLst>
+                  <a:outerShdw blurRad="228600" dist="50800" dir="5400000" algn="ctr" rotWithShape="0">
+                    <a:schemeClr val="tx1"/>
+                  </a:outerShdw>
+                </a:effectLst>
+              </a:rPr>
+              <a:t>peer-to-peer</a:t>
+            </a:r>
+            <a:br>
+              <a:rPr lang="pt-BR" b="1" dirty="0">
+                <a:solidFill>
+                  <a:schemeClr val="bg1"/>
+                </a:solidFill>
+                <a:effectLst>
+                  <a:outerShdw blurRad="228600" dist="50800" dir="5400000" algn="ctr" rotWithShape="0">
+                    <a:schemeClr val="tx1"/>
+                  </a:outerShdw>
+                </a:effectLst>
+              </a:rPr>
+            </a:br>
+            <a:r>
+              <a:rPr lang="pt-BR" b="1" dirty="0">
+                <a:solidFill>
+                  <a:schemeClr val="bg1"/>
+                </a:solidFill>
+                <a:effectLst>
+                  <a:outerShdw blurRad="228600" dist="50800" dir="5400000" algn="ctr" rotWithShape="0">
+                    <a:schemeClr val="tx1"/>
+                  </a:outerShdw>
+                </a:effectLst>
+              </a:rPr>
+              <a:t>(p2p, ponto-a-ponto)</a:t>
+            </a:r>
+            <a:endParaRPr lang="pt-BR" dirty="0">
+              <a:solidFill>
+                <a:schemeClr val="bg1"/>
+              </a:solidFill>
+              <a:effectLst>
+                <a:outerShdw blurRad="228600" dist="50800" dir="5400000" algn="ctr" rotWithShape="0">
+                  <a:schemeClr val="tx1"/>
+                </a:outerShdw>
+              </a:effectLst>
+            </a:endParaRPr>
+          </a:p>
+        </p:txBody>
+      </p:sp>
+      <p:sp>
+        <p:nvSpPr>
+          <p:cNvPr id="66" name="Content Placeholder 2">
+            <a:extLst>
+              <a:ext uri="{FF2B5EF4-FFF2-40B4-BE49-F238E27FC236}">
+                <a16:creationId xmlns:a16="http://schemas.microsoft.com/office/drawing/2014/main" id="{7DD7200E-83C5-FE41-A371-CC6A4884910F}"/>
+              </a:ext>
+            </a:extLst>
+          </p:cNvPr>
+          <p:cNvSpPr>
+            <a:spLocks noGrp="1"/>
+          </p:cNvSpPr>
+          <p:nvPr>
+            <p:ph idx="1"/>
+          </p:nvPr>
+        </p:nvSpPr>
+        <p:spPr>
+          <a:xfrm>
+            <a:off x="543374" y="1671597"/>
+            <a:ext cx="9915903" cy="4805403"/>
+          </a:xfrm>
+        </p:spPr>
+        <p:txBody>
+          <a:bodyPr>
+            <a:normAutofit/>
+          </a:bodyPr>
+          <a:lstStyle/>
+          <a:p>
+            <a:r>
+              <a:rPr lang="pt-BR" sz="2400" dirty="0"/>
+              <a:t>Para transferência de arquivos e chamadas de voz e vídeo, existe uma extensão XMPP chamada </a:t>
+            </a:r>
+            <a:r>
+              <a:rPr lang="pt-BR" sz="2400" dirty="0">
+                <a:hlinkClick r:id="rId2"/>
+              </a:rPr>
+              <a:t>Jingle</a:t>
+            </a:r>
+            <a:r>
+              <a:rPr lang="pt-BR" sz="2400" dirty="0"/>
+              <a:t> que permite a comunicação ponto-a-ponto (P2P) entre dois clientes</a:t>
+            </a:r>
+          </a:p>
+          <a:p>
+            <a:r>
+              <a:rPr lang="pt-BR" sz="2400" dirty="0"/>
+              <a:t>Desta forma, após a conexão ser estabelecida, não há intermediação dos servidores</a:t>
+            </a:r>
+          </a:p>
+          <a:p>
+            <a:r>
+              <a:rPr lang="pt-BR" sz="2400" dirty="0"/>
+              <a:t>Isto torna a comunicação mais rápida (por remover intermediários) e evita sobrecarga do servidor</a:t>
+            </a:r>
+          </a:p>
+          <a:p>
+            <a:r>
+              <a:rPr lang="pt-BR" sz="2400" dirty="0"/>
+              <a:t>No caso de chamadas de voz e vídeo, normalmente é utilizado UDP como protocolo de transporte que não garante entrega</a:t>
+            </a:r>
+          </a:p>
+          <a:p>
+            <a:r>
+              <a:rPr lang="pt-BR" sz="2400" dirty="0"/>
+              <a:t>Se um pacote de voz for perdido, isto não afeta a qualidade da conversa</a:t>
+            </a:r>
+          </a:p>
+          <a:p>
+            <a:r>
+              <a:rPr lang="pt-BR" sz="2400" dirty="0"/>
+              <a:t>Se a perda for grande, vai tornar a comunicação difícil</a:t>
+            </a:r>
+          </a:p>
+        </p:txBody>
+      </p:sp>
+      <p:sp>
+        <p:nvSpPr>
+          <p:cNvPr id="3" name="Slide Number Placeholder 2">
+            <a:extLst>
+              <a:ext uri="{FF2B5EF4-FFF2-40B4-BE49-F238E27FC236}">
+                <a16:creationId xmlns:a16="http://schemas.microsoft.com/office/drawing/2014/main" id="{E8782EBD-1415-0F4A-9755-9CBACA835A18}"/>
+              </a:ext>
+            </a:extLst>
+          </p:cNvPr>
+          <p:cNvSpPr>
+            <a:spLocks noGrp="1"/>
+          </p:cNvSpPr>
+          <p:nvPr>
+            <p:ph type="sldNum" sz="quarter" idx="12"/>
+          </p:nvPr>
+        </p:nvSpPr>
+        <p:spPr/>
+        <p:txBody>
+          <a:bodyPr/>
+          <a:lstStyle/>
+          <a:p>
+            <a:fld id="{2183B7EE-0FBE-B749-875F-ED24F5ECD71F}" type="slidenum">
+              <a:rPr lang="en-US" smtClean="0"/>
+              <a:t>17</a:t>
+            </a:fld>
+            <a:endParaRPr lang="en-US" dirty="0"/>
+          </a:p>
+        </p:txBody>
+      </p:sp>
+      <p:grpSp>
+        <p:nvGrpSpPr>
+          <p:cNvPr id="10" name="Group 9">
+            <a:extLst>
+              <a:ext uri="{FF2B5EF4-FFF2-40B4-BE49-F238E27FC236}">
+                <a16:creationId xmlns:a16="http://schemas.microsoft.com/office/drawing/2014/main" id="{26297A48-6531-9643-9B8A-8896A2B42AF6}"/>
+              </a:ext>
+            </a:extLst>
+          </p:cNvPr>
+          <p:cNvGrpSpPr/>
+          <p:nvPr/>
+        </p:nvGrpSpPr>
+        <p:grpSpPr>
+          <a:xfrm>
+            <a:off x="9451467" y="2228188"/>
+            <a:ext cx="2601994" cy="4373089"/>
+            <a:chOff x="9451467" y="2228188"/>
+            <a:chExt cx="2601994" cy="4373089"/>
+          </a:xfrm>
+        </p:grpSpPr>
+        <p:pic>
+          <p:nvPicPr>
+            <p:cNvPr id="70" name="Picture 69" descr="An open computer sitting on a table&#13;&#10;&#13;&#10;Description automatically generated">
+              <a:extLst>
+                <a:ext uri="{FF2B5EF4-FFF2-40B4-BE49-F238E27FC236}">
+                  <a16:creationId xmlns:a16="http://schemas.microsoft.com/office/drawing/2014/main" id="{41AB3B17-C3C6-E247-B359-2D49CD0A40E9}"/>
+                </a:ext>
+              </a:extLst>
+            </p:cNvPr>
+            <p:cNvPicPr>
+              <a:picLocks noChangeAspect="1"/>
+            </p:cNvPicPr>
+            <p:nvPr/>
+          </p:nvPicPr>
+          <p:blipFill>
+            <a:blip r:embed="rId3"/>
+            <a:stretch>
+              <a:fillRect/>
+            </a:stretch>
+          </p:blipFill>
+          <p:spPr>
+            <a:xfrm>
+              <a:off x="10403734" y="5672758"/>
+              <a:ext cx="671808" cy="516876"/>
+            </a:xfrm>
+            <a:prstGeom prst="rect">
+              <a:avLst/>
+            </a:prstGeom>
+          </p:spPr>
+        </p:pic>
+        <p:pic>
+          <p:nvPicPr>
+            <p:cNvPr id="71" name="Picture 70" descr="Screen of a cell phone&#13;&#10;&#13;&#10;Description automatically generated">
+              <a:extLst>
+                <a:ext uri="{FF2B5EF4-FFF2-40B4-BE49-F238E27FC236}">
+                  <a16:creationId xmlns:a16="http://schemas.microsoft.com/office/drawing/2014/main" id="{424D59C7-7A58-BE42-8B73-2373AD2F04CC}"/>
+                </a:ext>
+              </a:extLst>
+            </p:cNvPr>
+            <p:cNvPicPr>
+              <a:picLocks noChangeAspect="1"/>
+            </p:cNvPicPr>
+            <p:nvPr/>
+          </p:nvPicPr>
+          <p:blipFill>
+            <a:blip r:embed="rId4"/>
+            <a:stretch>
+              <a:fillRect/>
+            </a:stretch>
+          </p:blipFill>
+          <p:spPr>
+            <a:xfrm>
+              <a:off x="10616173" y="2228188"/>
+              <a:ext cx="180695" cy="361393"/>
+            </a:xfrm>
+            <a:prstGeom prst="rect">
+              <a:avLst/>
+            </a:prstGeom>
+          </p:spPr>
+        </p:pic>
+        <p:sp>
+          <p:nvSpPr>
+            <p:cNvPr id="105" name="TextBox 104">
+              <a:extLst>
+                <a:ext uri="{FF2B5EF4-FFF2-40B4-BE49-F238E27FC236}">
+                  <a16:creationId xmlns:a16="http://schemas.microsoft.com/office/drawing/2014/main" id="{3CDB4B8F-DE15-C04C-A1E5-B62AEC11810E}"/>
+                </a:ext>
+              </a:extLst>
+            </p:cNvPr>
+            <p:cNvSpPr txBox="1"/>
+            <p:nvPr/>
+          </p:nvSpPr>
+          <p:spPr>
+            <a:xfrm>
+              <a:off x="9509178" y="2688873"/>
+              <a:ext cx="2460931" cy="369332"/>
+            </a:xfrm>
+            <a:prstGeom prst="rect">
+              <a:avLst/>
+            </a:prstGeom>
+            <a:noFill/>
+          </p:spPr>
+          <p:txBody>
+            <a:bodyPr vert="horz" wrap="none" rtlCol="0">
+              <a:spAutoFit/>
+            </a:bodyPr>
+            <a:lstStyle/>
+            <a:p>
+              <a:pPr algn="ctr"/>
+              <a:r>
+                <a:rPr lang="en-US" dirty="0"/>
+                <a:t>joão@servidor1.com</a:t>
+              </a:r>
+              <a:endParaRPr lang="pt-BR" sz="1600" b="1" dirty="0"/>
+            </a:p>
+          </p:txBody>
+        </p:sp>
+        <p:sp>
+          <p:nvSpPr>
+            <p:cNvPr id="106" name="TextBox 105">
+              <a:extLst>
+                <a:ext uri="{FF2B5EF4-FFF2-40B4-BE49-F238E27FC236}">
+                  <a16:creationId xmlns:a16="http://schemas.microsoft.com/office/drawing/2014/main" id="{97B548FE-CFEA-684F-B028-6D45799AE056}"/>
+                </a:ext>
+              </a:extLst>
+            </p:cNvPr>
+            <p:cNvSpPr txBox="1"/>
+            <p:nvPr/>
+          </p:nvSpPr>
+          <p:spPr>
+            <a:xfrm>
+              <a:off x="9451467" y="6231945"/>
+              <a:ext cx="2601994" cy="369332"/>
+            </a:xfrm>
+            <a:prstGeom prst="rect">
+              <a:avLst/>
+            </a:prstGeom>
+            <a:noFill/>
+          </p:spPr>
+          <p:txBody>
+            <a:bodyPr vert="horz" wrap="none" rtlCol="0">
+              <a:spAutoFit/>
+            </a:bodyPr>
+            <a:lstStyle/>
+            <a:p>
+              <a:pPr algn="ctr"/>
+              <a:r>
+                <a:rPr lang="en-US" dirty="0"/>
+                <a:t>maria@servidor2.com</a:t>
+              </a:r>
+              <a:endParaRPr lang="pt-BR" sz="1600" b="1" dirty="0"/>
+            </a:p>
+          </p:txBody>
+        </p:sp>
+        <p:cxnSp>
+          <p:nvCxnSpPr>
+            <p:cNvPr id="61" name="Curved Connector 60">
+              <a:extLst>
+                <a:ext uri="{FF2B5EF4-FFF2-40B4-BE49-F238E27FC236}">
+                  <a16:creationId xmlns:a16="http://schemas.microsoft.com/office/drawing/2014/main" id="{E505FC33-66C4-3142-BE3C-80B261E42378}"/>
+                </a:ext>
+              </a:extLst>
+            </p:cNvPr>
+            <p:cNvCxnSpPr>
+              <a:cxnSpLocks/>
+              <a:stCxn id="105" idx="2"/>
+              <a:endCxn id="70" idx="0"/>
+            </p:cNvCxnSpPr>
+            <p:nvPr/>
+          </p:nvCxnSpPr>
+          <p:spPr>
+            <a:xfrm rot="5400000">
+              <a:off x="9432365" y="4365478"/>
+              <a:ext cx="2614553" cy="6"/>
+            </a:xfrm>
+            <a:prstGeom prst="curvedConnector3">
+              <a:avLst>
+                <a:gd name="adj1" fmla="val 50000"/>
+              </a:avLst>
+            </a:prstGeom>
+            <a:ln w="34925">
+              <a:solidFill>
+                <a:srgbClr val="00B0F0"/>
+              </a:solidFill>
+              <a:headEnd type="triangle"/>
+              <a:tailEnd type="triangle"/>
+            </a:ln>
+          </p:spPr>
+          <p:style>
+            <a:lnRef idx="1">
+              <a:schemeClr val="accent1"/>
+            </a:lnRef>
+            <a:fillRef idx="0">
+              <a:schemeClr val="accent1"/>
+            </a:fillRef>
+            <a:effectRef idx="0">
+              <a:schemeClr val="accent1"/>
+            </a:effectRef>
+            <a:fontRef idx="minor">
+              <a:schemeClr val="tx1"/>
+            </a:fontRef>
+          </p:style>
+        </p:cxnSp>
+      </p:grpSp>
+    </p:spTree>
+    <p:extLst>
+      <p:ext uri="{BB962C8B-B14F-4D97-AF65-F5344CB8AC3E}">
+        <p14:creationId xmlns:p14="http://schemas.microsoft.com/office/powerpoint/2010/main" val="1879898067"/>
+      </p:ext>
+    </p:extLst>
+  </p:cSld>
+  <p:clrMapOvr>
+    <a:masterClrMapping/>
+  </p:clrMapOvr>
+  <p:timing>
+    <p:tnLst>
+      <p:par>
+        <p:cTn id="1" dur="indefinite" restart="never" nodeType="tmRoot">
+          <p:childTnLst>
+            <p:seq concurrent="1" nextAc="seek">
+              <p:cTn id="2" dur="indefinite" nodeType="mainSeq">
+                <p:childTnLst>
+                  <p:par>
+                    <p:cTn id="3" fill="hold">
+                      <p:stCondLst>
+                        <p:cond delay="indefinite"/>
+                      </p:stCondLst>
+                      <p:childTnLst>
+                        <p:par>
+                          <p:cTn id="4" fill="hold">
+                            <p:stCondLst>
+                              <p:cond delay="0"/>
+                            </p:stCondLst>
+                            <p:childTnLst>
+                              <p:par>
+                                <p:cTn id="5" presetID="9" presetClass="entr" presetSubtype="0" fill="hold" grpId="0" nodeType="clickEffect">
+                                  <p:stCondLst>
+                                    <p:cond delay="0"/>
+                                  </p:stCondLst>
+                                  <p:childTnLst>
+                                    <p:set>
+                                      <p:cBhvr>
+                                        <p:cTn id="6" dur="1" fill="hold">
+                                          <p:stCondLst>
+                                            <p:cond delay="0"/>
+                                          </p:stCondLst>
+                                        </p:cTn>
+                                        <p:tgtEl>
+                                          <p:spTgt spid="66">
+                                            <p:txEl>
+                                              <p:pRg st="0" end="0"/>
+                                            </p:txEl>
+                                          </p:spTgt>
+                                        </p:tgtEl>
+                                        <p:attrNameLst>
+                                          <p:attrName>style.visibility</p:attrName>
+                                        </p:attrNameLst>
+                                      </p:cBhvr>
+                                      <p:to>
+                                        <p:strVal val="visible"/>
+                                      </p:to>
+                                    </p:set>
+                                    <p:animEffect transition="in" filter="dissolve">
+                                      <p:cBhvr>
+                                        <p:cTn id="7" dur="500"/>
+                                        <p:tgtEl>
+                                          <p:spTgt spid="66">
+                                            <p:txEl>
+                                              <p:pRg st="0" end="0"/>
+                                            </p:txEl>
+                                          </p:spTgt>
+                                        </p:tgtEl>
+                                      </p:cBhvr>
+                                    </p:animEffect>
+                                  </p:childTnLst>
+                                </p:cTn>
+                              </p:par>
+                              <p:par>
+                                <p:cTn id="8" presetID="9" presetClass="entr" presetSubtype="0" fill="hold" nodeType="withEffect">
+                                  <p:stCondLst>
+                                    <p:cond delay="0"/>
+                                  </p:stCondLst>
+                                  <p:childTnLst>
+                                    <p:set>
+                                      <p:cBhvr>
+                                        <p:cTn id="9" dur="1" fill="hold">
+                                          <p:stCondLst>
+                                            <p:cond delay="0"/>
+                                          </p:stCondLst>
+                                        </p:cTn>
+                                        <p:tgtEl>
+                                          <p:spTgt spid="10"/>
+                                        </p:tgtEl>
+                                        <p:attrNameLst>
+                                          <p:attrName>style.visibility</p:attrName>
+                                        </p:attrNameLst>
+                                      </p:cBhvr>
+                                      <p:to>
+                                        <p:strVal val="visible"/>
+                                      </p:to>
+                                    </p:set>
+                                    <p:animEffect transition="in" filter="dissolve">
+                                      <p:cBhvr>
+                                        <p:cTn id="10" dur="500"/>
+                                        <p:tgtEl>
+                                          <p:spTgt spid="10"/>
+                                        </p:tgtEl>
+                                      </p:cBhvr>
+                                    </p:animEffect>
+                                  </p:childTnLst>
+                                </p:cTn>
+                              </p:par>
+                            </p:childTnLst>
+                          </p:cTn>
+                        </p:par>
+                      </p:childTnLst>
+                    </p:cTn>
+                  </p:par>
+                  <p:par>
+                    <p:cTn id="11" fill="hold">
+                      <p:stCondLst>
+                        <p:cond delay="indefinite"/>
+                      </p:stCondLst>
+                      <p:childTnLst>
+                        <p:par>
+                          <p:cTn id="12" fill="hold">
+                            <p:stCondLst>
+                              <p:cond delay="0"/>
+                            </p:stCondLst>
+                            <p:childTnLst>
+                              <p:par>
+                                <p:cTn id="13" presetID="9" presetClass="entr" presetSubtype="0" fill="hold" grpId="0" nodeType="clickEffect">
+                                  <p:stCondLst>
+                                    <p:cond delay="0"/>
+                                  </p:stCondLst>
+                                  <p:childTnLst>
+                                    <p:set>
+                                      <p:cBhvr>
+                                        <p:cTn id="14" dur="1" fill="hold">
+                                          <p:stCondLst>
+                                            <p:cond delay="0"/>
+                                          </p:stCondLst>
+                                        </p:cTn>
+                                        <p:tgtEl>
+                                          <p:spTgt spid="66">
+                                            <p:txEl>
+                                              <p:pRg st="1" end="1"/>
+                                            </p:txEl>
+                                          </p:spTgt>
+                                        </p:tgtEl>
+                                        <p:attrNameLst>
+                                          <p:attrName>style.visibility</p:attrName>
+                                        </p:attrNameLst>
+                                      </p:cBhvr>
+                                      <p:to>
+                                        <p:strVal val="visible"/>
+                                      </p:to>
+                                    </p:set>
+                                    <p:animEffect transition="in" filter="dissolve">
+                                      <p:cBhvr>
+                                        <p:cTn id="15" dur="500"/>
+                                        <p:tgtEl>
+                                          <p:spTgt spid="66">
+                                            <p:txEl>
+                                              <p:pRg st="1" end="1"/>
+                                            </p:txEl>
+                                          </p:spTgt>
+                                        </p:tgtEl>
+                                      </p:cBhvr>
+                                    </p:animEffect>
+                                  </p:childTnLst>
+                                </p:cTn>
+                              </p:par>
+                            </p:childTnLst>
+                          </p:cTn>
+                        </p:par>
+                      </p:childTnLst>
+                    </p:cTn>
+                  </p:par>
+                  <p:par>
+                    <p:cTn id="16" fill="hold">
+                      <p:stCondLst>
+                        <p:cond delay="indefinite"/>
+                      </p:stCondLst>
+                      <p:childTnLst>
+                        <p:par>
+                          <p:cTn id="17" fill="hold">
+                            <p:stCondLst>
+                              <p:cond delay="0"/>
+                            </p:stCondLst>
+                            <p:childTnLst>
+                              <p:par>
+                                <p:cTn id="18" presetID="9" presetClass="entr" presetSubtype="0" fill="hold" grpId="0" nodeType="clickEffect">
+                                  <p:stCondLst>
+                                    <p:cond delay="0"/>
+                                  </p:stCondLst>
+                                  <p:childTnLst>
+                                    <p:set>
+                                      <p:cBhvr>
+                                        <p:cTn id="19" dur="1" fill="hold">
+                                          <p:stCondLst>
+                                            <p:cond delay="0"/>
+                                          </p:stCondLst>
+                                        </p:cTn>
+                                        <p:tgtEl>
+                                          <p:spTgt spid="66">
+                                            <p:txEl>
+                                              <p:pRg st="2" end="2"/>
+                                            </p:txEl>
+                                          </p:spTgt>
+                                        </p:tgtEl>
+                                        <p:attrNameLst>
+                                          <p:attrName>style.visibility</p:attrName>
+                                        </p:attrNameLst>
+                                      </p:cBhvr>
+                                      <p:to>
+                                        <p:strVal val="visible"/>
+                                      </p:to>
+                                    </p:set>
+                                    <p:animEffect transition="in" filter="dissolve">
+                                      <p:cBhvr>
+                                        <p:cTn id="20" dur="500"/>
+                                        <p:tgtEl>
+                                          <p:spTgt spid="66">
+                                            <p:txEl>
+                                              <p:pRg st="2" end="2"/>
+                                            </p:txEl>
+                                          </p:spTgt>
+                                        </p:tgtEl>
+                                      </p:cBhvr>
+                                    </p:animEffect>
+                                  </p:childTnLst>
+                                </p:cTn>
+                              </p:par>
+                            </p:childTnLst>
+                          </p:cTn>
+                        </p:par>
+                      </p:childTnLst>
+                    </p:cTn>
+                  </p:par>
+                  <p:par>
+                    <p:cTn id="21" fill="hold">
+                      <p:stCondLst>
+                        <p:cond delay="indefinite"/>
+                      </p:stCondLst>
+                      <p:childTnLst>
+                        <p:par>
+                          <p:cTn id="22" fill="hold">
+                            <p:stCondLst>
+                              <p:cond delay="0"/>
+                            </p:stCondLst>
+                            <p:childTnLst>
+                              <p:par>
+                                <p:cTn id="23" presetID="9" presetClass="entr" presetSubtype="0" fill="hold" grpId="0" nodeType="clickEffect">
+                                  <p:stCondLst>
+                                    <p:cond delay="0"/>
+                                  </p:stCondLst>
+                                  <p:childTnLst>
+                                    <p:set>
+                                      <p:cBhvr>
+                                        <p:cTn id="24" dur="1" fill="hold">
+                                          <p:stCondLst>
+                                            <p:cond delay="0"/>
+                                          </p:stCondLst>
+                                        </p:cTn>
+                                        <p:tgtEl>
+                                          <p:spTgt spid="66">
+                                            <p:txEl>
+                                              <p:pRg st="3" end="3"/>
+                                            </p:txEl>
+                                          </p:spTgt>
+                                        </p:tgtEl>
+                                        <p:attrNameLst>
+                                          <p:attrName>style.visibility</p:attrName>
+                                        </p:attrNameLst>
+                                      </p:cBhvr>
+                                      <p:to>
+                                        <p:strVal val="visible"/>
+                                      </p:to>
+                                    </p:set>
+                                    <p:animEffect transition="in" filter="dissolve">
+                                      <p:cBhvr>
+                                        <p:cTn id="25" dur="500"/>
+                                        <p:tgtEl>
+                                          <p:spTgt spid="66">
+                                            <p:txEl>
+                                              <p:pRg st="3" end="3"/>
+                                            </p:txEl>
+                                          </p:spTgt>
+                                        </p:tgtEl>
+                                      </p:cBhvr>
+                                    </p:animEffect>
+                                  </p:childTnLst>
+                                </p:cTn>
+                              </p:par>
+                            </p:childTnLst>
+                          </p:cTn>
+                        </p:par>
+                      </p:childTnLst>
+                    </p:cTn>
+                  </p:par>
+                  <p:par>
+                    <p:cTn id="26" fill="hold">
+                      <p:stCondLst>
+                        <p:cond delay="indefinite"/>
+                      </p:stCondLst>
+                      <p:childTnLst>
+                        <p:par>
+                          <p:cTn id="27" fill="hold">
+                            <p:stCondLst>
+                              <p:cond delay="0"/>
+                            </p:stCondLst>
+                            <p:childTnLst>
+                              <p:par>
+                                <p:cTn id="28" presetID="9" presetClass="entr" presetSubtype="0" fill="hold" grpId="0" nodeType="clickEffect">
+                                  <p:stCondLst>
+                                    <p:cond delay="0"/>
+                                  </p:stCondLst>
+                                  <p:childTnLst>
+                                    <p:set>
+                                      <p:cBhvr>
+                                        <p:cTn id="29" dur="1" fill="hold">
+                                          <p:stCondLst>
+                                            <p:cond delay="0"/>
+                                          </p:stCondLst>
+                                        </p:cTn>
+                                        <p:tgtEl>
+                                          <p:spTgt spid="66">
+                                            <p:txEl>
+                                              <p:pRg st="4" end="4"/>
+                                            </p:txEl>
+                                          </p:spTgt>
+                                        </p:tgtEl>
+                                        <p:attrNameLst>
+                                          <p:attrName>style.visibility</p:attrName>
+                                        </p:attrNameLst>
+                                      </p:cBhvr>
+                                      <p:to>
+                                        <p:strVal val="visible"/>
+                                      </p:to>
+                                    </p:set>
+                                    <p:animEffect transition="in" filter="dissolve">
+                                      <p:cBhvr>
+                                        <p:cTn id="30" dur="500"/>
+                                        <p:tgtEl>
+                                          <p:spTgt spid="66">
+                                            <p:txEl>
+                                              <p:pRg st="4" end="4"/>
+                                            </p:txEl>
+                                          </p:spTgt>
+                                        </p:tgtEl>
+                                      </p:cBhvr>
+                                    </p:animEffect>
+                                  </p:childTnLst>
+                                </p:cTn>
+                              </p:par>
+                            </p:childTnLst>
+                          </p:cTn>
+                        </p:par>
+                      </p:childTnLst>
+                    </p:cTn>
+                  </p:par>
+                  <p:par>
+                    <p:cTn id="31" fill="hold">
+                      <p:stCondLst>
+                        <p:cond delay="indefinite"/>
+                      </p:stCondLst>
+                      <p:childTnLst>
+                        <p:par>
+                          <p:cTn id="32" fill="hold">
+                            <p:stCondLst>
+                              <p:cond delay="0"/>
+                            </p:stCondLst>
+                            <p:childTnLst>
+                              <p:par>
+                                <p:cTn id="33" presetID="9" presetClass="entr" presetSubtype="0" fill="hold" grpId="0" nodeType="clickEffect">
+                                  <p:stCondLst>
+                                    <p:cond delay="0"/>
+                                  </p:stCondLst>
+                                  <p:childTnLst>
+                                    <p:set>
+                                      <p:cBhvr>
+                                        <p:cTn id="34" dur="1" fill="hold">
+                                          <p:stCondLst>
+                                            <p:cond delay="0"/>
+                                          </p:stCondLst>
+                                        </p:cTn>
+                                        <p:tgtEl>
+                                          <p:spTgt spid="66">
+                                            <p:txEl>
+                                              <p:pRg st="5" end="5"/>
+                                            </p:txEl>
+                                          </p:spTgt>
+                                        </p:tgtEl>
+                                        <p:attrNameLst>
+                                          <p:attrName>style.visibility</p:attrName>
+                                        </p:attrNameLst>
+                                      </p:cBhvr>
+                                      <p:to>
+                                        <p:strVal val="visible"/>
+                                      </p:to>
+                                    </p:set>
+                                    <p:animEffect transition="in" filter="dissolve">
+                                      <p:cBhvr>
+                                        <p:cTn id="35" dur="500"/>
+                                        <p:tgtEl>
+                                          <p:spTgt spid="66">
+                                            <p:txEl>
+                                              <p:pRg st="5" end="5"/>
+                                            </p:txEl>
+                                          </p:spTgt>
+                                        </p:tgtEl>
+                                      </p:cBhvr>
+                                    </p:animEffect>
+                                  </p:childTnLst>
+                                </p:cTn>
+                              </p:par>
+                            </p:childTnLst>
+                          </p:cTn>
+                        </p:par>
+                      </p:childTnLst>
+                    </p:cTn>
+                  </p:par>
+                </p:childTnLst>
+              </p:cTn>
+              <p:prevCondLst>
+                <p:cond evt="onPrev" delay="0">
+                  <p:tgtEl>
+                    <p:sldTgt/>
+                  </p:tgtEl>
+                </p:cond>
+              </p:prevCondLst>
+              <p:nextCondLst>
+                <p:cond evt="onNext" delay="0">
+                  <p:tgtEl>
+                    <p:sldTgt/>
+                  </p:tgtEl>
+                </p:cond>
+              </p:nextCondLst>
+            </p:seq>
+          </p:childTnLst>
+        </p:cTn>
+      </p:par>
+    </p:tnLst>
+    <p:bldLst>
+      <p:bldP spid="66" grpId="0" uiExpand="1" build="p"/>
+    </p:bldLst>
+  </p:timing>
+</p:sld>
+</file>
+
+<file path=ppt/slides/slide18.xml><?xml version="1.0" encoding="utf-8"?>
+<p:sld xmlns:a="http://schemas.openxmlformats.org/drawingml/2006/main" xmlns:r="http://schemas.openxmlformats.org/officeDocument/2006/relationships" xmlns:p="http://schemas.openxmlformats.org/presentationml/2006/main">
+  <p:cSld>
+    <p:spTree>
+      <p:nvGrpSpPr>
+        <p:cNvPr id="1" name=""/>
+        <p:cNvGrpSpPr/>
+        <p:nvPr/>
+      </p:nvGrpSpPr>
+      <p:grpSpPr>
+        <a:xfrm>
+          <a:off x="0" y="0"/>
+          <a:ext cx="0" cy="0"/>
+          <a:chOff x="0" y="0"/>
+          <a:chExt cx="0" cy="0"/>
+        </a:xfrm>
+      </p:grpSpPr>
+      <p:sp>
+        <p:nvSpPr>
           <p:cNvPr id="9" name="Title 8">
             <a:extLst>
               <a:ext uri="{FF2B5EF4-FFF2-40B4-BE49-F238E27FC236}">
@@ -11581,12 +12382,8 @@
               <a:t>[2] </a:t>
             </a:r>
             <a:r>
-              <a:rPr lang="en-US" sz="2800" dirty="0" err="1"/>
-              <a:t>Livro</a:t>
-            </a:r>
-            <a:r>
               <a:rPr lang="en-US" sz="2800" dirty="0"/>
-              <a:t> "</a:t>
+              <a:t>Livro "</a:t>
             </a:r>
             <a:r>
               <a:rPr lang="en-US" sz="2800" dirty="0">
@@ -11602,15 +12399,7 @@
           <a:p>
             <a:r>
               <a:rPr lang="en-US" sz="2800" dirty="0"/>
-              <a:t>[3] </a:t>
-            </a:r>
-            <a:r>
-              <a:rPr lang="en-US" sz="2800" dirty="0" err="1"/>
-              <a:t>Livro</a:t>
-            </a:r>
-            <a:r>
-              <a:rPr lang="en-US" sz="2800" dirty="0"/>
-              <a:t> "</a:t>
+              <a:t>[3] Livro "</a:t>
             </a:r>
             <a:r>
               <a:rPr lang="en-US" sz="2800" dirty="0">
@@ -11651,7 +12440,7 @@
           <a:p>
             <a:fld id="{2183B7EE-0FBE-B749-875F-ED24F5ECD71F}" type="slidenum">
               <a:rPr lang="en-US" smtClean="0"/>
-              <a:t>17</a:t>
+              <a:t>18</a:t>
             </a:fld>
             <a:endParaRPr lang="en-US" dirty="0"/>
           </a:p>
@@ -11812,40 +12601,8 @@
               <a:rPr lang="pt-BR" b="1" i="1" dirty="0"/>
             </a:br>
             <a:r>
-              <a:rPr lang="pt-BR" b="1" i="1" dirty="0" err="1"/>
-              <a:t>eXtensible</a:t>
-            </a:r>
-            <a:r>
               <a:rPr lang="pt-BR" b="1" i="1" dirty="0"/>
-              <a:t> </a:t>
-            </a:r>
-            <a:r>
-              <a:rPr lang="pt-BR" b="1" i="1" dirty="0" err="1"/>
-              <a:t>Messaging</a:t>
-            </a:r>
-            <a:r>
-              <a:rPr lang="pt-BR" b="1" i="1" dirty="0"/>
-              <a:t> </a:t>
-            </a:r>
-            <a:r>
-              <a:rPr lang="pt-BR" b="1" i="1" dirty="0" err="1"/>
-              <a:t>and</a:t>
-            </a:r>
-            <a:r>
-              <a:rPr lang="pt-BR" b="1" i="1" dirty="0"/>
-              <a:t> </a:t>
-            </a:r>
-            <a:r>
-              <a:rPr lang="pt-BR" b="1" i="1" dirty="0" err="1"/>
-              <a:t>Presense</a:t>
-            </a:r>
-            <a:r>
-              <a:rPr lang="pt-BR" b="1" i="1" dirty="0"/>
-              <a:t> </a:t>
-            </a:r>
-            <a:r>
-              <a:rPr lang="pt-BR" b="1" i="1" dirty="0" err="1"/>
-              <a:t>Protocol</a:t>
+              <a:t>eXtensible Messaging and Presense Protocol</a:t>
             </a:r>
             <a:endParaRPr lang="pt-BR" dirty="0"/>
           </a:p>
@@ -12195,40 +12952,8 @@
               <a:rPr lang="pt-BR" b="1" i="1" dirty="0"/>
             </a:br>
             <a:r>
-              <a:rPr lang="pt-BR" b="1" i="1" dirty="0" err="1"/>
-              <a:t>eXtensible</a:t>
-            </a:r>
-            <a:r>
               <a:rPr lang="pt-BR" b="1" i="1" dirty="0"/>
-              <a:t> </a:t>
-            </a:r>
-            <a:r>
-              <a:rPr lang="pt-BR" b="1" i="1" dirty="0" err="1"/>
-              <a:t>Messaging</a:t>
-            </a:r>
-            <a:r>
-              <a:rPr lang="pt-BR" b="1" i="1" dirty="0"/>
-              <a:t> </a:t>
-            </a:r>
-            <a:r>
-              <a:rPr lang="pt-BR" b="1" i="1" dirty="0" err="1"/>
-              <a:t>and</a:t>
-            </a:r>
-            <a:r>
-              <a:rPr lang="pt-BR" b="1" i="1" dirty="0"/>
-              <a:t> </a:t>
-            </a:r>
-            <a:r>
-              <a:rPr lang="pt-BR" b="1" i="1" dirty="0" err="1"/>
-              <a:t>Presense</a:t>
-            </a:r>
-            <a:r>
-              <a:rPr lang="pt-BR" b="1" i="1" dirty="0"/>
-              <a:t> </a:t>
-            </a:r>
-            <a:r>
-              <a:rPr lang="pt-BR" b="1" i="1" dirty="0" err="1"/>
-              <a:t>Protocol</a:t>
+              <a:t>eXtensible Messaging and Presense Protocol</a:t>
             </a:r>
             <a:endParaRPr lang="pt-BR" dirty="0"/>
           </a:p>
@@ -12264,26 +12989,10 @@
           <a:p>
             <a:r>
               <a:rPr lang="pt-BR" sz="2400" dirty="0"/>
-              <a:t>Apesar do ”</a:t>
-            </a:r>
-            <a:r>
-              <a:rPr lang="pt-BR" sz="2400" dirty="0" err="1"/>
-              <a:t>X</a:t>
-            </a:r>
-            <a:r>
-              <a:rPr lang="pt-BR" sz="2400" dirty="0"/>
-              <a:t>” </a:t>
-            </a:r>
-            <a:r>
-              <a:rPr lang="pt-BR" sz="2400" dirty="0" err="1"/>
-              <a:t>siginificar</a:t>
-            </a:r>
-            <a:r>
-              <a:rPr lang="pt-BR" sz="2400" dirty="0"/>
-              <a:t> </a:t>
-            </a:r>
-            <a:r>
-              <a:rPr lang="pt-BR" sz="2400" i="1" dirty="0" err="1"/>
+              <a:t>Apesar do ”X” significar </a:t>
+            </a:r>
+            <a:r>
+              <a:rPr lang="pt-BR" sz="2400" i="1" dirty="0"/>
               <a:t>eXtensible</a:t>
             </a:r>
             <a:r>
@@ -12294,18 +13003,10 @@
           <a:p>
             <a:r>
               <a:rPr lang="pt-BR" sz="2400" dirty="0"/>
-              <a:t>O “</a:t>
-            </a:r>
-            <a:r>
-              <a:rPr lang="pt-BR" sz="2400" dirty="0" err="1"/>
-              <a:t>X</a:t>
-            </a:r>
-            <a:r>
-              <a:rPr lang="pt-BR" sz="2400" dirty="0"/>
-              <a:t>” em XML também significa </a:t>
-            </a:r>
-            <a:r>
-              <a:rPr lang="pt-BR" sz="2400" i="1" dirty="0" err="1"/>
+              <a:t>O “X” em XML também significa </a:t>
+            </a:r>
+            <a:r>
+              <a:rPr lang="pt-BR" sz="2400" i="1" dirty="0"/>
               <a:t>eXtensible</a:t>
             </a:r>
             <a:r>
@@ -12611,20 +13312,8 @@
               <a:t>Comunicação segura com </a:t>
             </a:r>
             <a:r>
-              <a:rPr lang="pt-BR" sz="2400" i="1" dirty="0" err="1"/>
-              <a:t>Transport</a:t>
-            </a:r>
-            <a:r>
               <a:rPr lang="pt-BR" sz="2400" i="1" dirty="0"/>
-              <a:t> </a:t>
-            </a:r>
-            <a:r>
-              <a:rPr lang="pt-BR" sz="2400" i="1" dirty="0" err="1"/>
-              <a:t>Layer</a:t>
-            </a:r>
-            <a:r>
-              <a:rPr lang="pt-BR" sz="2400" i="1" dirty="0"/>
-              <a:t> Security</a:t>
+              <a:t>Transport Layer Security</a:t>
             </a:r>
             <a:r>
               <a:rPr lang="pt-BR" sz="2400" dirty="0"/>
@@ -12990,7 +13679,7 @@
               <a:t>Iniciado em 1999 com o nome de </a:t>
             </a:r>
             <a:r>
-              <a:rPr lang="pt-BR" sz="2400" i="1" dirty="0" err="1"/>
+              <a:rPr lang="pt-BR" sz="2400" i="1" dirty="0"/>
               <a:t>Jabber</a:t>
             </a:r>
             <a:r>
@@ -13001,23 +13690,7 @@
           <a:p>
             <a:r>
               <a:rPr lang="pt-BR" sz="2400" dirty="0"/>
-              <a:t>A primeira grande empresa a usar o protocolo foi a Google em 2005 para o desenvolvimento do </a:t>
-            </a:r>
-            <a:r>
-              <a:rPr lang="pt-BR" sz="2400" dirty="0" err="1"/>
-              <a:t>GTalk</a:t>
-            </a:r>
-            <a:r>
-              <a:rPr lang="pt-BR" sz="2400" dirty="0"/>
-              <a:t> (atualmente Google </a:t>
-            </a:r>
-            <a:r>
-              <a:rPr lang="pt-BR" sz="2400" dirty="0" err="1"/>
-              <a:t>Hangout</a:t>
-            </a:r>
-            <a:r>
-              <a:rPr lang="pt-BR" sz="2400" dirty="0"/>
-              <a:t>).</a:t>
+              <a:t>A primeira grande empresa a usar o protocolo foi a Google em 2005 para o desenvolvimento do GTalk (atualmente Google Hangout).</a:t>
             </a:r>
           </a:p>
         </p:txBody>
@@ -13316,15 +13989,7 @@
           <a:p>
             <a:r>
               <a:rPr lang="pt-BR" sz="2400" dirty="0"/>
-              <a:t>Na verdade, o </a:t>
-            </a:r>
-            <a:r>
-              <a:rPr lang="pt-BR" sz="2400" dirty="0" err="1"/>
-              <a:t>WhatApp</a:t>
-            </a:r>
-            <a:r>
-              <a:rPr lang="pt-BR" sz="2400" dirty="0"/>
-              <a:t> utiliza uma versão </a:t>
+              <a:t>Na verdade, o WhatApp utiliza uma versão </a:t>
             </a:r>
             <a:r>
               <a:rPr lang="pt-BR" sz="2400" dirty="0">
@@ -13705,30 +14370,14 @@
             <a:pPr algn="just"/>
             <a:r>
               <a:rPr lang="pt-BR" sz="2400" dirty="0"/>
-              <a:t>O uso de uma versão proprietária do XMPP prejudica a interoperabilidade garantida pelo protocolo original: uma </a:t>
-            </a:r>
-            <a:r>
-              <a:rPr lang="pt-BR" sz="2400" dirty="0" err="1"/>
-              <a:t>app</a:t>
-            </a:r>
+              <a:t>O uso de uma versão proprietária do XMPP prejudica a interoperabilidade garantida pelo protocolo original: uma app usando XMPP não pode facilmente se comunicar com WhatsApp</a:t>
+            </a:r>
+          </a:p>
+          <a:p>
+            <a:pPr algn="just"/>
             <a:r>
               <a:rPr lang="pt-BR" sz="2400" dirty="0"/>
-              <a:t> usando XMPP não pode facilmente se comunicar com WhatsApp</a:t>
-            </a:r>
-          </a:p>
-          <a:p>
-            <a:pPr algn="just"/>
-            <a:r>
-              <a:rPr lang="pt-BR" sz="2400" dirty="0"/>
-              <a:t>Aplicações clientes de </a:t>
-            </a:r>
-            <a:r>
-              <a:rPr lang="pt-BR" sz="2400" dirty="0" err="1"/>
-              <a:t>WhatApp</a:t>
-            </a:r>
-            <a:r>
-              <a:rPr lang="pt-BR" sz="2400" dirty="0"/>
-              <a:t> para diferentes plataformas como Linux e Windows são desenvolvidas por meio de “gambiarras” 😲</a:t>
+              <a:t>Aplicações clientes de WhatApp para diferentes plataformas como Linux e Windows são desenvolvidas por meio de “gambiarras” 😲</a:t>
             </a:r>
           </a:p>
           <a:p>
@@ -14113,15 +14762,7 @@
             <a:pPr algn="ctr"/>
             <a:r>
               <a:rPr lang="pt-BR" b="1" i="1" dirty="0"/>
-              <a:t>Outros </a:t>
-            </a:r>
-            <a:r>
-              <a:rPr lang="pt-BR" b="1" i="1" dirty="0" err="1"/>
-              <a:t>Apps</a:t>
-            </a:r>
-            <a:r>
-              <a:rPr lang="pt-BR" b="1" i="1" dirty="0"/>
-              <a:t> Famosos</a:t>
+              <a:t>Outros Apps Famosos</a:t>
             </a:r>
             <a:endParaRPr lang="pt-BR" dirty="0"/>
           </a:p>
@@ -14157,30 +14798,18 @@
           <a:p>
             <a:r>
               <a:rPr lang="pt-BR" sz="2400" dirty="0"/>
-              <a:t>Se você está se perguntando sobre outros </a:t>
-            </a:r>
-            <a:r>
-              <a:rPr lang="pt-BR" sz="2400" dirty="0" err="1"/>
-              <a:t>apps</a:t>
-            </a:r>
-            <a:r>
-              <a:rPr lang="pt-BR" sz="2400" dirty="0"/>
-              <a:t> como </a:t>
-            </a:r>
-            <a:r>
-              <a:rPr lang="pt-BR" sz="2400" i="1" dirty="0" err="1"/>
-              <a:t>Facebook</a:t>
+              <a:t>Se você está se perguntando sobre outros apps como </a:t>
             </a:r>
             <a:r>
               <a:rPr lang="pt-BR" sz="2400" i="1" dirty="0"/>
-              <a:t> Messenger</a:t>
+              <a:t>Facebook Messenger</a:t>
             </a:r>
             <a:r>
               <a:rPr lang="pt-BR" sz="2400" dirty="0"/>
               <a:t> ou </a:t>
             </a:r>
             <a:r>
-              <a:rPr lang="pt-BR" sz="2400" i="1" dirty="0" err="1"/>
+              <a:rPr lang="pt-BR" sz="2400" i="1" dirty="0"/>
               <a:t>Telegram</a:t>
             </a:r>
             <a:r>
@@ -14244,15 +14873,7 @@
           <a:p>
             <a:r>
               <a:rPr lang="pt-BR" sz="2400" dirty="0"/>
-              <a:t>O </a:t>
-            </a:r>
-            <a:r>
-              <a:rPr lang="pt-BR" sz="2400" dirty="0" err="1"/>
-              <a:t>Telegram</a:t>
-            </a:r>
-            <a:r>
-              <a:rPr lang="pt-BR" sz="2400" dirty="0"/>
-              <a:t> usa o protocolo </a:t>
+              <a:t>O Telegram usa o protocolo </a:t>
             </a:r>
             <a:r>
               <a:rPr lang="pt-BR" sz="2400" dirty="0">
@@ -14617,12 +15238,8 @@
           </a:p>
           <a:p>
             <a:r>
-              <a:rPr lang="pt-BR" sz="2400" dirty="0" err="1"/>
-              <a:t>Avatar</a:t>
-            </a:r>
-            <a:r>
               <a:rPr lang="pt-BR" sz="2400" dirty="0"/>
-              <a:t> (foto para o perfil do usuário)</a:t>
+              <a:t>Avatar (foto para o perfil do usuário)</a:t>
             </a:r>
           </a:p>
           <a:p>

</xml_diff>